<commit_message>
srt project update process json data as one record for one status/blog/share
</commit_message>
<xml_diff>
--- a/slides.pptx
+++ b/slides.pptx
@@ -435,11 +435,11 @@
           <c:showPercent val="0"/>
           <c:showBubbleSize val="0"/>
         </c:dLbls>
-        <c:axId val="403440808"/>
-        <c:axId val="403441200"/>
+        <c:axId val="302085056"/>
+        <c:axId val="302085448"/>
       </c:radarChart>
       <c:catAx>
-        <c:axId val="403440808"/>
+        <c:axId val="302085056"/>
         <c:scaling>
           <c:orientation val="minMax"/>
         </c:scaling>
@@ -482,7 +482,7 @@
             <a:endParaRPr lang="zh-CN"/>
           </a:p>
         </c:txPr>
-        <c:crossAx val="403441200"/>
+        <c:crossAx val="302085448"/>
         <c:crosses val="autoZero"/>
         <c:auto val="1"/>
         <c:lblAlgn val="ctr"/>
@@ -490,7 +490,7 @@
         <c:noMultiLvlLbl val="0"/>
       </c:catAx>
       <c:valAx>
-        <c:axId val="403441200"/>
+        <c:axId val="302085448"/>
         <c:scaling>
           <c:orientation val="minMax"/>
           <c:max val="1"/>
@@ -544,7 +544,7 @@
             <a:endParaRPr lang="zh-CN"/>
           </a:p>
         </c:txPr>
-        <c:crossAx val="403440808"/>
+        <c:crossAx val="302085056"/>
         <c:crosses val="autoZero"/>
         <c:crossBetween val="between"/>
       </c:valAx>
@@ -793,11 +793,11 @@
           <c:showBubbleSize val="0"/>
         </c:dLbls>
         <c:gapWidth val="150"/>
-        <c:axId val="297667128"/>
-        <c:axId val="297667520"/>
+        <c:axId val="216993704"/>
+        <c:axId val="216478848"/>
       </c:barChart>
       <c:catAx>
-        <c:axId val="297667128"/>
+        <c:axId val="216993704"/>
         <c:scaling>
           <c:orientation val="minMax"/>
         </c:scaling>
@@ -834,7 +834,7 @@
             <a:endParaRPr lang="zh-CN"/>
           </a:p>
         </c:txPr>
-        <c:crossAx val="297667520"/>
+        <c:crossAx val="216478848"/>
         <c:crosses val="autoZero"/>
         <c:auto val="1"/>
         <c:lblAlgn val="ctr"/>
@@ -842,7 +842,7 @@
         <c:noMultiLvlLbl val="0"/>
       </c:catAx>
       <c:valAx>
-        <c:axId val="297667520"/>
+        <c:axId val="216478848"/>
         <c:scaling>
           <c:orientation val="minMax"/>
         </c:scaling>
@@ -893,7 +893,7 @@
             <a:endParaRPr lang="zh-CN"/>
           </a:p>
         </c:txPr>
-        <c:crossAx val="297667128"/>
+        <c:crossAx val="216993704"/>
         <c:crosses val="autoZero"/>
         <c:crossBetween val="between"/>
       </c:valAx>
@@ -1582,11 +1582,11 @@
         </c:dLbls>
         <c:marker val="1"/>
         <c:smooth val="0"/>
-        <c:axId val="403441984"/>
-        <c:axId val="403441592"/>
+        <c:axId val="301460216"/>
+        <c:axId val="301460608"/>
       </c:lineChart>
       <c:catAx>
-        <c:axId val="403441984"/>
+        <c:axId val="301460216"/>
         <c:scaling>
           <c:orientation val="minMax"/>
         </c:scaling>
@@ -1629,7 +1629,7 @@
             <a:endParaRPr lang="zh-CN"/>
           </a:p>
         </c:txPr>
-        <c:crossAx val="403441592"/>
+        <c:crossAx val="301460608"/>
         <c:crosses val="autoZero"/>
         <c:auto val="1"/>
         <c:lblAlgn val="ctr"/>
@@ -1637,7 +1637,7 @@
         <c:noMultiLvlLbl val="0"/>
       </c:catAx>
       <c:valAx>
-        <c:axId val="403441592"/>
+        <c:axId val="301460608"/>
         <c:scaling>
           <c:orientation val="minMax"/>
           <c:min val="9.0000000000000024E-2"/>
@@ -1689,7 +1689,7 @@
             <a:endParaRPr lang="zh-CN"/>
           </a:p>
         </c:txPr>
-        <c:crossAx val="403441984"/>
+        <c:crossAx val="301460216"/>
         <c:crosses val="autoZero"/>
         <c:crossBetween val="between"/>
       </c:valAx>
@@ -16717,7 +16717,11 @@
           <a:p>
             <a:r>
               <a:rPr lang="zh-CN" altLang="en-US" dirty="0" smtClean="0"/>
-              <a:t>模型性能对比</a:t>
+              <a:t>模型</a:t>
+            </a:r>
+            <a:r>
+              <a:rPr lang="zh-CN" altLang="en-US" dirty="0" smtClean="0"/>
+              <a:t>性能对比</a:t>
             </a:r>
             <a:endParaRPr lang="zh-CN" altLang="en-US" dirty="0"/>
           </a:p>
@@ -16787,46 +16791,56 @@
       </p:grpSpPr>
       <p:pic>
         <p:nvPicPr>
-          <p:cNvPr id="7" name="图片 6" descr="屏幕快照 2013-12-31 上午3.33.06.png"/>
+          <p:cNvPr id="2" name="图片 1"/>
           <p:cNvPicPr>
             <a:picLocks noChangeAspect="1"/>
           </p:cNvPicPr>
           <p:nvPr/>
         </p:nvPicPr>
         <p:blipFill>
-          <a:blip r:embed="rId2">
-            <a:extLst>
-              <a:ext uri="{BEBA8EAE-BF5A-486C-A8C5-ECC9F3942E4B}">
-                <a14:imgProps xmlns:a14="http://schemas.microsoft.com/office/drawing/2010/main">
-                  <a14:imgLayer r:embed="rId3">
-                    <a14:imgEffect>
-                      <a14:colorTemperature colorTemp="7200"/>
-                    </a14:imgEffect>
-                    <a14:imgEffect>
-                      <a14:brightnessContrast bright="40000" contrast="-20000"/>
-                    </a14:imgEffect>
-                  </a14:imgLayer>
-                </a14:imgProps>
-              </a:ext>
-              <a:ext uri="{28A0092B-C50C-407E-A947-70E740481C1C}">
-                <a14:useLocalDpi xmlns:a14="http://schemas.microsoft.com/office/drawing/2010/main" val="0"/>
-              </a:ext>
-            </a:extLst>
-          </a:blip>
+          <a:blip r:embed="rId2"/>
           <a:stretch>
             <a:fillRect/>
           </a:stretch>
         </p:blipFill>
         <p:spPr>
           <a:xfrm>
-            <a:off x="1537152" y="567199"/>
-            <a:ext cx="6188684" cy="5715115"/>
+            <a:off x="1626572" y="1878877"/>
+            <a:ext cx="5866050" cy="4412385"/>
           </a:xfrm>
           <a:prstGeom prst="rect">
             <a:avLst/>
           </a:prstGeom>
         </p:spPr>
       </p:pic>
+      <p:sp>
+        <p:nvSpPr>
+          <p:cNvPr id="4" name="标题 1"/>
+          <p:cNvSpPr>
+            <a:spLocks noGrp="1"/>
+          </p:cNvSpPr>
+          <p:nvPr>
+            <p:ph type="title"/>
+          </p:nvPr>
+        </p:nvSpPr>
+        <p:spPr>
+          <a:xfrm>
+            <a:off x="822960" y="286604"/>
+            <a:ext cx="7543800" cy="1450757"/>
+          </a:xfrm>
+        </p:spPr>
+        <p:txBody>
+          <a:bodyPr/>
+          <a:lstStyle/>
+          <a:p>
+            <a:r>
+              <a:rPr lang="zh-CN" altLang="en-US" dirty="0" smtClean="0"/>
+              <a:t>测试结果界面</a:t>
+            </a:r>
+            <a:endParaRPr lang="zh-CN" altLang="en-US" dirty="0"/>
+          </a:p>
+        </p:txBody>
+      </p:sp>
     </p:spTree>
     <p:extLst>
       <p:ext uri="{BB962C8B-B14F-4D97-AF65-F5344CB8AC3E}">
@@ -17122,6 +17136,13 @@
   <p:clrMapOvr>
     <a:masterClrMapping/>
   </p:clrMapOvr>
+  <p:timing>
+    <p:tnLst>
+      <p:par>
+        <p:cTn id="1" dur="indefinite" restart="never" nodeType="tmRoot"/>
+      </p:par>
+    </p:tnLst>
+  </p:timing>
 </p:sld>
 </file>
 
@@ -17167,11 +17188,7 @@
             </a:r>
             <a:r>
               <a:rPr lang="zh-CN" altLang="en-US" dirty="0" smtClean="0"/>
-              <a:t>                            </a:t>
-            </a:r>
-            <a:r>
-              <a:rPr lang="zh-CN" altLang="en-US" dirty="0" smtClean="0"/>
-              <a:t>？</a:t>
+              <a:t>                            ？</a:t>
             </a:r>
             <a:endParaRPr lang="zh-CN" altLang="en-US" dirty="0"/>
           </a:p>
@@ -18229,15 +18246,7 @@
           <a:p>
             <a:r>
               <a:rPr kumimoji="1" lang="zh-CN" altLang="en-US" dirty="0" smtClean="0"/>
-              <a:t>制作问卷，通过</a:t>
-            </a:r>
-            <a:r>
-              <a:rPr kumimoji="1" lang="zh-CN" altLang="en-US" dirty="0" smtClean="0"/>
-              <a:t>人人应用</a:t>
-            </a:r>
-            <a:r>
-              <a:rPr kumimoji="1" lang="zh-CN" altLang="en-US" dirty="0" smtClean="0"/>
-              <a:t>获取“标准集”</a:t>
+              <a:t>制作问卷，通过人人应用获取“标准集”</a:t>
             </a:r>
             <a:endParaRPr kumimoji="1" lang="zh-CN" altLang="en-US" dirty="0"/>
           </a:p>

</xml_diff>